<commit_message>
added module 3 submission
</commit_message>
<xml_diff>
--- a/module_2/kpmg-virtual-internship-module-2.pptx
+++ b/module_2/kpmg-virtual-internship-module-2.pptx
@@ -2033,7 +2033,7 @@
           </a:ln>
           <a:extLst>
             <a:ext uri="{C572A759-6A51-4108-AA02-DFA0A04FC94B}">
-              <ma14:wrappingTextBoxFlag xmlns="" xmlns:ma14="http://schemas.microsoft.com/office/mac/drawingml/2011/main" val="1"/>
+              <ma14:wrappingTextBoxFlag xmlns:ma14="http://schemas.microsoft.com/office/mac/drawingml/2011/main" xmlns="" val="1"/>
             </a:ext>
           </a:extLst>
         </p:spPr>
@@ -2072,7 +2072,7 @@
           </a:ln>
           <a:extLst>
             <a:ext uri="{C572A759-6A51-4108-AA02-DFA0A04FC94B}">
-              <ma14:wrappingTextBoxFlag xmlns="" xmlns:ma14="http://schemas.microsoft.com/office/mac/drawingml/2011/main" val="1"/>
+              <ma14:wrappingTextBoxFlag xmlns:ma14="http://schemas.microsoft.com/office/mac/drawingml/2011/main" xmlns="" val="1"/>
             </a:ext>
           </a:extLst>
         </p:spPr>
@@ -3132,7 +3132,7 @@
           </a:ln>
           <a:extLst>
             <a:ext uri="{C572A759-6A51-4108-AA02-DFA0A04FC94B}">
-              <ma14:wrappingTextBoxFlag xmlns="" xmlns:ma14="http://schemas.microsoft.com/office/mac/drawingml/2011/main" val="1"/>
+              <ma14:wrappingTextBoxFlag xmlns:ma14="http://schemas.microsoft.com/office/mac/drawingml/2011/main" xmlns="" val="1"/>
             </a:ext>
           </a:extLst>
         </p:spPr>
@@ -3179,7 +3179,7 @@
           </a:ln>
           <a:extLst>
             <a:ext uri="{C572A759-6A51-4108-AA02-DFA0A04FC94B}">
-              <ma14:wrappingTextBoxFlag xmlns="" xmlns:ma14="http://schemas.microsoft.com/office/mac/drawingml/2011/main" val="1"/>
+              <ma14:wrappingTextBoxFlag xmlns:ma14="http://schemas.microsoft.com/office/mac/drawingml/2011/main" xmlns="" val="1"/>
             </a:ext>
           </a:extLst>
         </p:spPr>
@@ -3248,7 +3248,7 @@
           </a:ln>
           <a:extLst>
             <a:ext uri="{C572A759-6A51-4108-AA02-DFA0A04FC94B}">
-              <ma14:wrappingTextBoxFlag xmlns="" xmlns:ma14="http://schemas.microsoft.com/office/mac/drawingml/2011/main" val="1"/>
+              <ma14:wrappingTextBoxFlag xmlns:ma14="http://schemas.microsoft.com/office/mac/drawingml/2011/main" xmlns="" val="1"/>
             </a:ext>
           </a:extLst>
         </p:spPr>
@@ -3402,7 +3402,7 @@
           </a:ln>
           <a:extLst>
             <a:ext uri="{C572A759-6A51-4108-AA02-DFA0A04FC94B}">
-              <ma14:wrappingTextBoxFlag xmlns="" xmlns:ma14="http://schemas.microsoft.com/office/mac/drawingml/2011/main" val="1"/>
+              <ma14:wrappingTextBoxFlag xmlns:ma14="http://schemas.microsoft.com/office/mac/drawingml/2011/main" xmlns="" val="1"/>
             </a:ext>
           </a:extLst>
         </p:spPr>
@@ -3445,7 +3445,7 @@
           </a:ln>
           <a:extLst>
             <a:ext uri="{C572A759-6A51-4108-AA02-DFA0A04FC94B}">
-              <ma14:wrappingTextBoxFlag xmlns="" xmlns:ma14="http://schemas.microsoft.com/office/mac/drawingml/2011/main" val="1"/>
+              <ma14:wrappingTextBoxFlag xmlns:ma14="http://schemas.microsoft.com/office/mac/drawingml/2011/main" xmlns="" val="1"/>
             </a:ext>
           </a:extLst>
         </p:spPr>
@@ -3656,7 +3656,7 @@
           </a:ln>
           <a:extLst>
             <a:ext uri="{C572A759-6A51-4108-AA02-DFA0A04FC94B}">
-              <ma14:wrappingTextBoxFlag xmlns="" xmlns:ma14="http://schemas.microsoft.com/office/mac/drawingml/2011/main" val="1"/>
+              <ma14:wrappingTextBoxFlag xmlns:ma14="http://schemas.microsoft.com/office/mac/drawingml/2011/main" xmlns="" val="1"/>
             </a:ext>
           </a:extLst>
         </p:spPr>
@@ -3699,7 +3699,7 @@
           </a:ln>
           <a:extLst>
             <a:ext uri="{C572A759-6A51-4108-AA02-DFA0A04FC94B}">
-              <ma14:wrappingTextBoxFlag xmlns="" xmlns:ma14="http://schemas.microsoft.com/office/mac/drawingml/2011/main" val="1"/>
+              <ma14:wrappingTextBoxFlag xmlns:ma14="http://schemas.microsoft.com/office/mac/drawingml/2011/main" xmlns="" val="1"/>
             </a:ext>
           </a:extLst>
         </p:spPr>
@@ -3863,7 +3863,7 @@
           </a:ln>
           <a:extLst>
             <a:ext uri="{C572A759-6A51-4108-AA02-DFA0A04FC94B}">
-              <ma14:wrappingTextBoxFlag xmlns="" xmlns:ma14="http://schemas.microsoft.com/office/mac/drawingml/2011/main" val="1"/>
+              <ma14:wrappingTextBoxFlag xmlns:ma14="http://schemas.microsoft.com/office/mac/drawingml/2011/main" xmlns="" val="1"/>
             </a:ext>
           </a:extLst>
         </p:spPr>
@@ -3906,7 +3906,7 @@
           </a:ln>
           <a:extLst>
             <a:ext uri="{C572A759-6A51-4108-AA02-DFA0A04FC94B}">
-              <ma14:wrappingTextBoxFlag xmlns="" xmlns:ma14="http://schemas.microsoft.com/office/mac/drawingml/2011/main" val="1"/>
+              <ma14:wrappingTextBoxFlag xmlns:ma14="http://schemas.microsoft.com/office/mac/drawingml/2011/main" xmlns="" val="1"/>
             </a:ext>
           </a:extLst>
         </p:spPr>
@@ -3955,7 +3955,7 @@
           </a:ln>
           <a:extLst>
             <a:ext uri="{C572A759-6A51-4108-AA02-DFA0A04FC94B}">
-              <ma14:wrappingTextBoxFlag xmlns="" xmlns:ma14="http://schemas.microsoft.com/office/mac/drawingml/2011/main" val="1"/>
+              <ma14:wrappingTextBoxFlag xmlns:ma14="http://schemas.microsoft.com/office/mac/drawingml/2011/main" xmlns="" val="1"/>
             </a:ext>
           </a:extLst>
         </p:spPr>
@@ -4215,7 +4215,7 @@
           </a:ln>
           <a:extLst>
             <a:ext uri="{C572A759-6A51-4108-AA02-DFA0A04FC94B}">
-              <ma14:wrappingTextBoxFlag xmlns="" xmlns:ma14="http://schemas.microsoft.com/office/mac/drawingml/2011/main" val="1"/>
+              <ma14:wrappingTextBoxFlag xmlns:ma14="http://schemas.microsoft.com/office/mac/drawingml/2011/main" xmlns="" val="1"/>
             </a:ext>
           </a:extLst>
         </p:spPr>
@@ -4258,7 +4258,7 @@
           </a:ln>
           <a:extLst>
             <a:ext uri="{C572A759-6A51-4108-AA02-DFA0A04FC94B}">
-              <ma14:wrappingTextBoxFlag xmlns="" xmlns:ma14="http://schemas.microsoft.com/office/mac/drawingml/2011/main" val="1"/>
+              <ma14:wrappingTextBoxFlag xmlns:ma14="http://schemas.microsoft.com/office/mac/drawingml/2011/main" xmlns="" val="1"/>
             </a:ext>
           </a:extLst>
         </p:spPr>
@@ -4422,7 +4422,7 @@
           </a:ln>
           <a:extLst>
             <a:ext uri="{C572A759-6A51-4108-AA02-DFA0A04FC94B}">
-              <ma14:wrappingTextBoxFlag xmlns="" xmlns:ma14="http://schemas.microsoft.com/office/mac/drawingml/2011/main" val="1"/>
+              <ma14:wrappingTextBoxFlag xmlns:ma14="http://schemas.microsoft.com/office/mac/drawingml/2011/main" xmlns="" val="1"/>
             </a:ext>
           </a:extLst>
         </p:spPr>
@@ -4465,7 +4465,7 @@
           </a:ln>
           <a:extLst>
             <a:ext uri="{C572A759-6A51-4108-AA02-DFA0A04FC94B}">
-              <ma14:wrappingTextBoxFlag xmlns="" xmlns:ma14="http://schemas.microsoft.com/office/mac/drawingml/2011/main" val="1"/>
+              <ma14:wrappingTextBoxFlag xmlns:ma14="http://schemas.microsoft.com/office/mac/drawingml/2011/main" xmlns="" val="1"/>
             </a:ext>
           </a:extLst>
         </p:spPr>
@@ -4629,7 +4629,7 @@
           </a:ln>
           <a:extLst>
             <a:ext uri="{C572A759-6A51-4108-AA02-DFA0A04FC94B}">
-              <ma14:wrappingTextBoxFlag xmlns="" xmlns:ma14="http://schemas.microsoft.com/office/mac/drawingml/2011/main" val="1"/>
+              <ma14:wrappingTextBoxFlag xmlns:ma14="http://schemas.microsoft.com/office/mac/drawingml/2011/main" xmlns="" val="1"/>
             </a:ext>
           </a:extLst>
         </p:spPr>
@@ -4672,7 +4672,7 @@
           </a:ln>
           <a:extLst>
             <a:ext uri="{C572A759-6A51-4108-AA02-DFA0A04FC94B}">
-              <ma14:wrappingTextBoxFlag xmlns="" xmlns:ma14="http://schemas.microsoft.com/office/mac/drawingml/2011/main" val="1"/>
+              <ma14:wrappingTextBoxFlag xmlns:ma14="http://schemas.microsoft.com/office/mac/drawingml/2011/main" xmlns="" val="1"/>
             </a:ext>
           </a:extLst>
         </p:spPr>
@@ -4836,7 +4836,7 @@
           </a:ln>
           <a:extLst>
             <a:ext uri="{C572A759-6A51-4108-AA02-DFA0A04FC94B}">
-              <ma14:wrappingTextBoxFlag xmlns="" xmlns:ma14="http://schemas.microsoft.com/office/mac/drawingml/2011/main" val="1"/>
+              <ma14:wrappingTextBoxFlag xmlns:ma14="http://schemas.microsoft.com/office/mac/drawingml/2011/main" xmlns="" val="1"/>
             </a:ext>
           </a:extLst>
         </p:spPr>
@@ -4879,7 +4879,7 @@
           </a:ln>
           <a:extLst>
             <a:ext uri="{C572A759-6A51-4108-AA02-DFA0A04FC94B}">
-              <ma14:wrappingTextBoxFlag xmlns="" xmlns:ma14="http://schemas.microsoft.com/office/mac/drawingml/2011/main" val="1"/>
+              <ma14:wrappingTextBoxFlag xmlns:ma14="http://schemas.microsoft.com/office/mac/drawingml/2011/main" xmlns="" val="1"/>
             </a:ext>
           </a:extLst>
         </p:spPr>
@@ -5043,7 +5043,7 @@
           </a:ln>
           <a:extLst>
             <a:ext uri="{C572A759-6A51-4108-AA02-DFA0A04FC94B}">
-              <ma14:wrappingTextBoxFlag xmlns="" xmlns:ma14="http://schemas.microsoft.com/office/mac/drawingml/2011/main" val="1"/>
+              <ma14:wrappingTextBoxFlag xmlns:ma14="http://schemas.microsoft.com/office/mac/drawingml/2011/main" xmlns="" val="1"/>
             </a:ext>
           </a:extLst>
         </p:spPr>
@@ -5086,7 +5086,7 @@
           </a:ln>
           <a:extLst>
             <a:ext uri="{C572A759-6A51-4108-AA02-DFA0A04FC94B}">
-              <ma14:wrappingTextBoxFlag xmlns="" xmlns:ma14="http://schemas.microsoft.com/office/mac/drawingml/2011/main" val="1"/>
+              <ma14:wrappingTextBoxFlag xmlns:ma14="http://schemas.microsoft.com/office/mac/drawingml/2011/main" xmlns="" val="1"/>
             </a:ext>
           </a:extLst>
         </p:spPr>
@@ -5250,7 +5250,7 @@
           </a:ln>
           <a:extLst>
             <a:ext uri="{C572A759-6A51-4108-AA02-DFA0A04FC94B}">
-              <ma14:wrappingTextBoxFlag xmlns="" xmlns:ma14="http://schemas.microsoft.com/office/mac/drawingml/2011/main" val="1"/>
+              <ma14:wrappingTextBoxFlag xmlns:ma14="http://schemas.microsoft.com/office/mac/drawingml/2011/main" xmlns="" val="1"/>
             </a:ext>
           </a:extLst>
         </p:spPr>
@@ -5293,7 +5293,7 @@
           </a:ln>
           <a:extLst>
             <a:ext uri="{C572A759-6A51-4108-AA02-DFA0A04FC94B}">
-              <ma14:wrappingTextBoxFlag xmlns="" xmlns:ma14="http://schemas.microsoft.com/office/mac/drawingml/2011/main" val="1"/>
+              <ma14:wrappingTextBoxFlag xmlns:ma14="http://schemas.microsoft.com/office/mac/drawingml/2011/main" xmlns="" val="1"/>
             </a:ext>
           </a:extLst>
         </p:spPr>
@@ -5457,7 +5457,7 @@
           </a:ln>
           <a:extLst>
             <a:ext uri="{C572A759-6A51-4108-AA02-DFA0A04FC94B}">
-              <ma14:wrappingTextBoxFlag xmlns="" xmlns:ma14="http://schemas.microsoft.com/office/mac/drawingml/2011/main" val="1"/>
+              <ma14:wrappingTextBoxFlag xmlns:ma14="http://schemas.microsoft.com/office/mac/drawingml/2011/main" xmlns="" val="1"/>
             </a:ext>
           </a:extLst>
         </p:spPr>
@@ -5500,7 +5500,7 @@
           </a:ln>
           <a:extLst>
             <a:ext uri="{C572A759-6A51-4108-AA02-DFA0A04FC94B}">
-              <ma14:wrappingTextBoxFlag xmlns="" xmlns:ma14="http://schemas.microsoft.com/office/mac/drawingml/2011/main" val="1"/>
+              <ma14:wrappingTextBoxFlag xmlns:ma14="http://schemas.microsoft.com/office/mac/drawingml/2011/main" xmlns="" val="1"/>
             </a:ext>
           </a:extLst>
         </p:spPr>
@@ -5602,7 +5602,7 @@
           </a:ln>
           <a:extLst>
             <a:ext uri="{C572A759-6A51-4108-AA02-DFA0A04FC94B}">
-              <ma14:wrappingTextBoxFlag xmlns:ma14="http://schemas.microsoft.com/office/mac/drawingml/2011/main" xmlns="" val="1"/>
+              <ma14:wrappingTextBoxFlag xmlns="" xmlns:ma14="http://schemas.microsoft.com/office/mac/drawingml/2011/main" val="1"/>
             </a:ext>
           </a:extLst>
         </p:spPr>
@@ -5760,7 +5760,7 @@
           </a:ln>
           <a:extLst>
             <a:ext uri="{C572A759-6A51-4108-AA02-DFA0A04FC94B}">
-              <ma14:wrappingTextBoxFlag xmlns="" xmlns:ma14="http://schemas.microsoft.com/office/mac/drawingml/2011/main" val="1"/>
+              <ma14:wrappingTextBoxFlag xmlns:ma14="http://schemas.microsoft.com/office/mac/drawingml/2011/main" xmlns="" val="1"/>
             </a:ext>
           </a:extLst>
         </p:spPr>
@@ -5803,7 +5803,7 @@
           </a:ln>
           <a:extLst>
             <a:ext uri="{C572A759-6A51-4108-AA02-DFA0A04FC94B}">
-              <ma14:wrappingTextBoxFlag xmlns="" xmlns:ma14="http://schemas.microsoft.com/office/mac/drawingml/2011/main" val="1"/>
+              <ma14:wrappingTextBoxFlag xmlns:ma14="http://schemas.microsoft.com/office/mac/drawingml/2011/main" xmlns="" val="1"/>
             </a:ext>
           </a:extLst>
         </p:spPr>
@@ -5980,7 +5980,7 @@
           </a:ln>
           <a:extLst>
             <a:ext uri="{C572A759-6A51-4108-AA02-DFA0A04FC94B}">
-              <ma14:wrappingTextBoxFlag xmlns="" xmlns:ma14="http://schemas.microsoft.com/office/mac/drawingml/2011/main" val="1"/>
+              <ma14:wrappingTextBoxFlag xmlns:ma14="http://schemas.microsoft.com/office/mac/drawingml/2011/main" xmlns="" val="1"/>
             </a:ext>
           </a:extLst>
         </p:spPr>
@@ -6023,7 +6023,7 @@
           </a:ln>
           <a:extLst>
             <a:ext uri="{C572A759-6A51-4108-AA02-DFA0A04FC94B}">
-              <ma14:wrappingTextBoxFlag xmlns="" xmlns:ma14="http://schemas.microsoft.com/office/mac/drawingml/2011/main" val="1"/>
+              <ma14:wrappingTextBoxFlag xmlns:ma14="http://schemas.microsoft.com/office/mac/drawingml/2011/main" xmlns="" val="1"/>
             </a:ext>
           </a:extLst>
         </p:spPr>
@@ -6182,7 +6182,7 @@
           </a:ln>
           <a:extLst>
             <a:ext uri="{C572A759-6A51-4108-AA02-DFA0A04FC94B}">
-              <ma14:wrappingTextBoxFlag xmlns="" xmlns:ma14="http://schemas.microsoft.com/office/mac/drawingml/2011/main" val="1"/>
+              <ma14:wrappingTextBoxFlag xmlns:ma14="http://schemas.microsoft.com/office/mac/drawingml/2011/main" xmlns="" val="1"/>
             </a:ext>
           </a:extLst>
         </p:spPr>
@@ -6225,7 +6225,7 @@
           </a:ln>
           <a:extLst>
             <a:ext uri="{C572A759-6A51-4108-AA02-DFA0A04FC94B}">
-              <ma14:wrappingTextBoxFlag xmlns="" xmlns:ma14="http://schemas.microsoft.com/office/mac/drawingml/2011/main" val="1"/>
+              <ma14:wrappingTextBoxFlag xmlns:ma14="http://schemas.microsoft.com/office/mac/drawingml/2011/main" xmlns="" val="1"/>
             </a:ext>
           </a:extLst>
         </p:spPr>
@@ -6389,7 +6389,7 @@
           </a:ln>
           <a:extLst>
             <a:ext uri="{C572A759-6A51-4108-AA02-DFA0A04FC94B}">
-              <ma14:wrappingTextBoxFlag xmlns="" xmlns:ma14="http://schemas.microsoft.com/office/mac/drawingml/2011/main" val="1"/>
+              <ma14:wrappingTextBoxFlag xmlns:ma14="http://schemas.microsoft.com/office/mac/drawingml/2011/main" xmlns="" val="1"/>
             </a:ext>
           </a:extLst>
         </p:spPr>
@@ -6432,7 +6432,7 @@
           </a:ln>
           <a:extLst>
             <a:ext uri="{C572A759-6A51-4108-AA02-DFA0A04FC94B}">
-              <ma14:wrappingTextBoxFlag xmlns="" xmlns:ma14="http://schemas.microsoft.com/office/mac/drawingml/2011/main" val="1"/>
+              <ma14:wrappingTextBoxFlag xmlns:ma14="http://schemas.microsoft.com/office/mac/drawingml/2011/main" xmlns="" val="1"/>
             </a:ext>
           </a:extLst>
         </p:spPr>
@@ -6477,7 +6477,7 @@
           <p:nvPr>
             <p:extLst>
               <p:ext uri="{D42A27DB-BD31-4B8C-83A1-F6EECF244321}">
-                <p14:modId xmlns:p14="http://schemas.microsoft.com/office/powerpoint/2010/main" val="4044575866"/>
+                <p14:modId xmlns:p14="http://schemas.microsoft.com/office/powerpoint/2010/main" val="968216743"/>
               </p:ext>
             </p:extLst>
           </p:nvPr>
@@ -6691,7 +6691,7 @@
                           <a:effectLst/>
                           <a:latin typeface="+mn-lt"/>
                         </a:rPr>
-                        <a:t>Platinum Customer</a:t>
+                        <a:t>Platinum</a:t>
                       </a:r>
                     </a:p>
                   </a:txBody>
@@ -6856,7 +6856,7 @@
                     <a:p>
                       <a:pPr algn="ctr" fontAlgn="ctr"/>
                       <a:r>
-                        <a:rPr lang="en-IN" sz="1400" b="0" i="0" u="none" strike="noStrike">
+                        <a:rPr lang="en-IN" sz="1400" b="0" i="0" u="none" strike="noStrike" dirty="0">
                           <a:solidFill>
                             <a:srgbClr val="000000"/>
                           </a:solidFill>
@@ -7028,7 +7028,7 @@
                     <a:p>
                       <a:pPr algn="ctr" fontAlgn="ctr"/>
                       <a:r>
-                        <a:rPr lang="en-IN" sz="1400" b="0" i="0" u="none" strike="noStrike">
+                        <a:rPr lang="en-IN" sz="1400" b="0" i="0" u="none" strike="noStrike" dirty="0">
                           <a:solidFill>
                             <a:srgbClr val="000000"/>
                           </a:solidFill>
@@ -7207,7 +7207,7 @@
                           <a:effectLst/>
                           <a:latin typeface="+mn-lt"/>
                         </a:rPr>
-                        <a:t>Recent Customer</a:t>
+                        <a:t>Recent</a:t>
                       </a:r>
                     </a:p>
                   </a:txBody>
@@ -7372,14 +7372,14 @@
                     <a:p>
                       <a:pPr algn="ctr" fontAlgn="ctr"/>
                       <a:r>
-                        <a:rPr lang="en-IN" sz="1400" b="0" i="0" u="none" strike="noStrike">
+                        <a:rPr lang="en-IN" sz="1400" b="0" i="0" u="none" strike="noStrike" dirty="0">
                           <a:solidFill>
                             <a:srgbClr val="000000"/>
                           </a:solidFill>
                           <a:effectLst/>
                           <a:latin typeface="+mn-lt"/>
                         </a:rPr>
-                        <a:t>Average Customer</a:t>
+                        <a:t>Average</a:t>
                       </a:r>
                     </a:p>
                   </a:txBody>
@@ -7544,14 +7544,14 @@
                     <a:p>
                       <a:pPr algn="ctr" fontAlgn="ctr"/>
                       <a:r>
-                        <a:rPr lang="en-IN" sz="1400" b="0" i="0" u="none" strike="noStrike">
+                        <a:rPr lang="en-IN" sz="1400" b="0" i="0" u="none" strike="noStrike" dirty="0">
                           <a:solidFill>
                             <a:srgbClr val="000000"/>
                           </a:solidFill>
                           <a:effectLst/>
                           <a:latin typeface="+mn-lt"/>
                         </a:rPr>
-                        <a:t>High Risk Customer</a:t>
+                        <a:t>High Risk</a:t>
                       </a:r>
                     </a:p>
                   </a:txBody>
@@ -7698,14 +7698,14 @@
                     <a:p>
                       <a:pPr algn="ctr" fontAlgn="ctr"/>
                       <a:r>
-                        <a:rPr lang="en-IN" sz="1400" b="0" i="0" u="none" strike="noStrike">
+                        <a:rPr lang="en-IN" sz="1400" b="0" i="0" u="none" strike="noStrike" dirty="0">
                           <a:solidFill>
                             <a:srgbClr val="000000"/>
                           </a:solidFill>
                           <a:effectLst/>
                           <a:latin typeface="+mn-lt"/>
                         </a:rPr>
-                        <a:t>Evasive Customer</a:t>
+                        <a:t>Evasive</a:t>
                       </a:r>
                     </a:p>
                   </a:txBody>
@@ -7852,14 +7852,14 @@
                     <a:p>
                       <a:pPr algn="ctr" fontAlgn="ctr"/>
                       <a:r>
-                        <a:rPr lang="en-IN" sz="1400" b="0" i="0" u="none" strike="noStrike">
+                        <a:rPr lang="en-IN" sz="1400" b="0" i="0" u="none" strike="noStrike" dirty="0">
                           <a:solidFill>
                             <a:srgbClr val="000000"/>
                           </a:solidFill>
                           <a:effectLst/>
                           <a:latin typeface="+mn-lt"/>
                         </a:rPr>
-                        <a:t>Losing Customer</a:t>
+                        <a:t>Losing</a:t>
                       </a:r>
                     </a:p>
                   </a:txBody>
@@ -8006,14 +8006,14 @@
                     <a:p>
                       <a:pPr algn="ctr" fontAlgn="ctr"/>
                       <a:r>
-                        <a:rPr lang="en-IN" sz="1400" b="0" i="0" u="none" strike="noStrike">
+                        <a:rPr lang="en-IN" sz="1400" b="0" i="0" u="none" strike="noStrike" dirty="0">
                           <a:solidFill>
                             <a:srgbClr val="000000"/>
                           </a:solidFill>
                           <a:effectLst/>
                           <a:latin typeface="+mn-lt"/>
                         </a:rPr>
-                        <a:t>Inactive Customers</a:t>
+                        <a:t>Inactive</a:t>
                       </a:r>
                     </a:p>
                   </a:txBody>
@@ -8160,14 +8160,14 @@
                     <a:p>
                       <a:pPr algn="ctr" fontAlgn="ctr"/>
                       <a:r>
-                        <a:rPr lang="en-IN" sz="1400" b="0" i="0" u="none" strike="noStrike">
+                        <a:rPr lang="en-IN" sz="1400" b="0" i="0" u="none" strike="noStrike" dirty="0">
                           <a:solidFill>
                             <a:srgbClr val="000000"/>
                           </a:solidFill>
                           <a:effectLst/>
                           <a:latin typeface="+mn-lt"/>
                         </a:rPr>
-                        <a:t>Lost Customers</a:t>
+                        <a:t>Lost</a:t>
                       </a:r>
                     </a:p>
                   </a:txBody>
@@ -8397,7 +8397,7 @@
           </a:ln>
           <a:extLst>
             <a:ext uri="{C572A759-6A51-4108-AA02-DFA0A04FC94B}">
-              <ma14:wrappingTextBoxFlag xmlns="" xmlns:ma14="http://schemas.microsoft.com/office/mac/drawingml/2011/main" val="1"/>
+              <ma14:wrappingTextBoxFlag xmlns:ma14="http://schemas.microsoft.com/office/mac/drawingml/2011/main" xmlns="" val="1"/>
             </a:ext>
           </a:extLst>
         </p:spPr>
@@ -8440,7 +8440,7 @@
           </a:ln>
           <a:extLst>
             <a:ext uri="{C572A759-6A51-4108-AA02-DFA0A04FC94B}">
-              <ma14:wrappingTextBoxFlag xmlns="" xmlns:ma14="http://schemas.microsoft.com/office/mac/drawingml/2011/main" val="1"/>
+              <ma14:wrappingTextBoxFlag xmlns:ma14="http://schemas.microsoft.com/office/mac/drawingml/2011/main" xmlns="" val="1"/>
             </a:ext>
           </a:extLst>
         </p:spPr>
@@ -8489,7 +8489,7 @@
           </a:ln>
           <a:extLst>
             <a:ext uri="{C572A759-6A51-4108-AA02-DFA0A04FC94B}">
-              <ma14:wrappingTextBoxFlag xmlns="" xmlns:ma14="http://schemas.microsoft.com/office/mac/drawingml/2011/main" val="1"/>
+              <ma14:wrappingTextBoxFlag xmlns:ma14="http://schemas.microsoft.com/office/mac/drawingml/2011/main" xmlns="" val="1"/>
             </a:ext>
           </a:extLst>
         </p:spPr>
@@ -8662,7 +8662,7 @@
           </a:ln>
           <a:extLst>
             <a:ext uri="{C572A759-6A51-4108-AA02-DFA0A04FC94B}">
-              <ma14:wrappingTextBoxFlag xmlns="" xmlns:ma14="http://schemas.microsoft.com/office/mac/drawingml/2011/main" val="1"/>
+              <ma14:wrappingTextBoxFlag xmlns:ma14="http://schemas.microsoft.com/office/mac/drawingml/2011/main" xmlns="" val="1"/>
             </a:ext>
           </a:extLst>
         </p:spPr>
@@ -8772,7 +8772,7 @@
           </a:ln>
           <a:extLst>
             <a:ext uri="{C572A759-6A51-4108-AA02-DFA0A04FC94B}">
-              <ma14:wrappingTextBoxFlag xmlns="" xmlns:ma14="http://schemas.microsoft.com/office/mac/drawingml/2011/main" val="1"/>
+              <ma14:wrappingTextBoxFlag xmlns:ma14="http://schemas.microsoft.com/office/mac/drawingml/2011/main" xmlns="" val="1"/>
             </a:ext>
           </a:extLst>
         </p:spPr>
@@ -9014,7 +9014,7 @@
           </a:ln>
           <a:extLst>
             <a:ext uri="{C572A759-6A51-4108-AA02-DFA0A04FC94B}">
-              <ma14:wrappingTextBoxFlag xmlns="" xmlns:ma14="http://schemas.microsoft.com/office/mac/drawingml/2011/main" val="1"/>
+              <ma14:wrappingTextBoxFlag xmlns:ma14="http://schemas.microsoft.com/office/mac/drawingml/2011/main" xmlns="" val="1"/>
             </a:ext>
           </a:extLst>
         </p:spPr>
@@ -9057,7 +9057,7 @@
           </a:ln>
           <a:extLst>
             <a:ext uri="{C572A759-6A51-4108-AA02-DFA0A04FC94B}">
-              <ma14:wrappingTextBoxFlag xmlns="" xmlns:ma14="http://schemas.microsoft.com/office/mac/drawingml/2011/main" val="1"/>
+              <ma14:wrappingTextBoxFlag xmlns:ma14="http://schemas.microsoft.com/office/mac/drawingml/2011/main" xmlns="" val="1"/>
             </a:ext>
           </a:extLst>
         </p:spPr>
@@ -11300,7 +11300,7 @@
           </a:ln>
           <a:extLst>
             <a:ext uri="{C572A759-6A51-4108-AA02-DFA0A04FC94B}">
-              <ma14:wrappingTextBoxFlag xmlns="" xmlns:ma14="http://schemas.microsoft.com/office/mac/drawingml/2011/main" val="1"/>
+              <ma14:wrappingTextBoxFlag xmlns:ma14="http://schemas.microsoft.com/office/mac/drawingml/2011/main" xmlns="" val="1"/>
             </a:ext>
           </a:extLst>
         </p:spPr>
@@ -11343,7 +11343,7 @@
           </a:ln>
           <a:extLst>
             <a:ext uri="{C572A759-6A51-4108-AA02-DFA0A04FC94B}">
-              <ma14:wrappingTextBoxFlag xmlns="" xmlns:ma14="http://schemas.microsoft.com/office/mac/drawingml/2011/main" val="1"/>
+              <ma14:wrappingTextBoxFlag xmlns:ma14="http://schemas.microsoft.com/office/mac/drawingml/2011/main" xmlns="" val="1"/>
             </a:ext>
           </a:extLst>
         </p:spPr>
@@ -11392,7 +11392,7 @@
           </a:ln>
           <a:extLst>
             <a:ext uri="{C572A759-6A51-4108-AA02-DFA0A04FC94B}">
-              <ma14:wrappingTextBoxFlag xmlns="" xmlns:ma14="http://schemas.microsoft.com/office/mac/drawingml/2011/main" val="1"/>
+              <ma14:wrappingTextBoxFlag xmlns:ma14="http://schemas.microsoft.com/office/mac/drawingml/2011/main" xmlns="" val="1"/>
             </a:ext>
           </a:extLst>
         </p:spPr>
@@ -11680,7 +11680,7 @@
           </a:ln>
           <a:extLst>
             <a:ext uri="{C572A759-6A51-4108-AA02-DFA0A04FC94B}">
-              <ma14:wrappingTextBoxFlag xmlns="" xmlns:ma14="http://schemas.microsoft.com/office/mac/drawingml/2011/main" val="1"/>
+              <ma14:wrappingTextBoxFlag xmlns:ma14="http://schemas.microsoft.com/office/mac/drawingml/2011/main" xmlns="" val="1"/>
             </a:ext>
           </a:extLst>
         </p:spPr>
@@ -11723,7 +11723,7 @@
           </a:ln>
           <a:extLst>
             <a:ext uri="{C572A759-6A51-4108-AA02-DFA0A04FC94B}">
-              <ma14:wrappingTextBoxFlag xmlns="" xmlns:ma14="http://schemas.microsoft.com/office/mac/drawingml/2011/main" val="1"/>
+              <ma14:wrappingTextBoxFlag xmlns:ma14="http://schemas.microsoft.com/office/mac/drawingml/2011/main" xmlns="" val="1"/>
             </a:ext>
           </a:extLst>
         </p:spPr>
@@ -11934,7 +11934,7 @@
           </a:ln>
           <a:extLst>
             <a:ext uri="{C572A759-6A51-4108-AA02-DFA0A04FC94B}">
-              <ma14:wrappingTextBoxFlag xmlns="" xmlns:ma14="http://schemas.microsoft.com/office/mac/drawingml/2011/main" val="1"/>
+              <ma14:wrappingTextBoxFlag xmlns:ma14="http://schemas.microsoft.com/office/mac/drawingml/2011/main" xmlns="" val="1"/>
             </a:ext>
           </a:extLst>
         </p:spPr>
@@ -11977,7 +11977,7 @@
           </a:ln>
           <a:extLst>
             <a:ext uri="{C572A759-6A51-4108-AA02-DFA0A04FC94B}">
-              <ma14:wrappingTextBoxFlag xmlns="" xmlns:ma14="http://schemas.microsoft.com/office/mac/drawingml/2011/main" val="1"/>
+              <ma14:wrappingTextBoxFlag xmlns:ma14="http://schemas.microsoft.com/office/mac/drawingml/2011/main" xmlns="" val="1"/>
             </a:ext>
           </a:extLst>
         </p:spPr>
@@ -12188,7 +12188,7 @@
           </a:ln>
           <a:extLst>
             <a:ext uri="{C572A759-6A51-4108-AA02-DFA0A04FC94B}">
-              <ma14:wrappingTextBoxFlag xmlns="" xmlns:ma14="http://schemas.microsoft.com/office/mac/drawingml/2011/main" val="1"/>
+              <ma14:wrappingTextBoxFlag xmlns:ma14="http://schemas.microsoft.com/office/mac/drawingml/2011/main" xmlns="" val="1"/>
             </a:ext>
           </a:extLst>
         </p:spPr>
@@ -12231,7 +12231,7 @@
           </a:ln>
           <a:extLst>
             <a:ext uri="{C572A759-6A51-4108-AA02-DFA0A04FC94B}">
-              <ma14:wrappingTextBoxFlag xmlns="" xmlns:ma14="http://schemas.microsoft.com/office/mac/drawingml/2011/main" val="1"/>
+              <ma14:wrappingTextBoxFlag xmlns:ma14="http://schemas.microsoft.com/office/mac/drawingml/2011/main" xmlns="" val="1"/>
             </a:ext>
           </a:extLst>
         </p:spPr>
@@ -12442,7 +12442,7 @@
           </a:ln>
           <a:extLst>
             <a:ext uri="{C572A759-6A51-4108-AA02-DFA0A04FC94B}">
-              <ma14:wrappingTextBoxFlag xmlns="" xmlns:ma14="http://schemas.microsoft.com/office/mac/drawingml/2011/main" val="1"/>
+              <ma14:wrappingTextBoxFlag xmlns:ma14="http://schemas.microsoft.com/office/mac/drawingml/2011/main" xmlns="" val="1"/>
             </a:ext>
           </a:extLst>
         </p:spPr>
@@ -12485,7 +12485,7 @@
           </a:ln>
           <a:extLst>
             <a:ext uri="{C572A759-6A51-4108-AA02-DFA0A04FC94B}">
-              <ma14:wrappingTextBoxFlag xmlns="" xmlns:ma14="http://schemas.microsoft.com/office/mac/drawingml/2011/main" val="1"/>
+              <ma14:wrappingTextBoxFlag xmlns:ma14="http://schemas.microsoft.com/office/mac/drawingml/2011/main" xmlns="" val="1"/>
             </a:ext>
           </a:extLst>
         </p:spPr>
@@ -12692,7 +12692,7 @@
           </a:ln>
           <a:extLst>
             <a:ext uri="{C572A759-6A51-4108-AA02-DFA0A04FC94B}">
-              <ma14:wrappingTextBoxFlag xmlns="" xmlns:ma14="http://schemas.microsoft.com/office/mac/drawingml/2011/main" val="1"/>
+              <ma14:wrappingTextBoxFlag xmlns:ma14="http://schemas.microsoft.com/office/mac/drawingml/2011/main" xmlns="" val="1"/>
             </a:ext>
           </a:extLst>
         </p:spPr>
@@ -12735,7 +12735,7 @@
           </a:ln>
           <a:extLst>
             <a:ext uri="{C572A759-6A51-4108-AA02-DFA0A04FC94B}">
-              <ma14:wrappingTextBoxFlag xmlns="" xmlns:ma14="http://schemas.microsoft.com/office/mac/drawingml/2011/main" val="1"/>
+              <ma14:wrappingTextBoxFlag xmlns:ma14="http://schemas.microsoft.com/office/mac/drawingml/2011/main" xmlns="" val="1"/>
             </a:ext>
           </a:extLst>
         </p:spPr>

</xml_diff>